<commit_message>
[FEAT] Adding GP1 report material
</commit_message>
<xml_diff>
--- a/Templates/Classroom/Video/Video Intro Template 0.pptx
+++ b/Templates/Classroom/Video/Video Intro Template 0.pptx
@@ -270,7 +270,7 @@
           <a:p>
             <a:fld id="{154673EC-443E-4E64-9ECA-ED48BC552C15}" type="datetimeFigureOut">
               <a:rPr lang="en-US" smtClean="0"/>
-              <a:t>5/14/2023</a:t>
+              <a:t>10-Jun-23</a:t>
             </a:fld>
             <a:endParaRPr lang="en-US"/>
           </a:p>
@@ -468,7 +468,7 @@
           <a:p>
             <a:fld id="{154673EC-443E-4E64-9ECA-ED48BC552C15}" type="datetimeFigureOut">
               <a:rPr lang="en-US" smtClean="0"/>
-              <a:t>5/14/2023</a:t>
+              <a:t>10-Jun-23</a:t>
             </a:fld>
             <a:endParaRPr lang="en-US"/>
           </a:p>
@@ -676,7 +676,7 @@
           <a:p>
             <a:fld id="{154673EC-443E-4E64-9ECA-ED48BC552C15}" type="datetimeFigureOut">
               <a:rPr lang="en-US" smtClean="0"/>
-              <a:t>5/14/2023</a:t>
+              <a:t>10-Jun-23</a:t>
             </a:fld>
             <a:endParaRPr lang="en-US"/>
           </a:p>
@@ -874,7 +874,7 @@
           <a:p>
             <a:fld id="{154673EC-443E-4E64-9ECA-ED48BC552C15}" type="datetimeFigureOut">
               <a:rPr lang="en-US" smtClean="0"/>
-              <a:t>5/14/2023</a:t>
+              <a:t>10-Jun-23</a:t>
             </a:fld>
             <a:endParaRPr lang="en-US"/>
           </a:p>
@@ -1149,7 +1149,7 @@
           <a:p>
             <a:fld id="{154673EC-443E-4E64-9ECA-ED48BC552C15}" type="datetimeFigureOut">
               <a:rPr lang="en-US" smtClean="0"/>
-              <a:t>5/14/2023</a:t>
+              <a:t>10-Jun-23</a:t>
             </a:fld>
             <a:endParaRPr lang="en-US"/>
           </a:p>
@@ -1414,7 +1414,7 @@
           <a:p>
             <a:fld id="{154673EC-443E-4E64-9ECA-ED48BC552C15}" type="datetimeFigureOut">
               <a:rPr lang="en-US" smtClean="0"/>
-              <a:t>5/14/2023</a:t>
+              <a:t>10-Jun-23</a:t>
             </a:fld>
             <a:endParaRPr lang="en-US"/>
           </a:p>
@@ -1826,7 +1826,7 @@
           <a:p>
             <a:fld id="{154673EC-443E-4E64-9ECA-ED48BC552C15}" type="datetimeFigureOut">
               <a:rPr lang="en-US" smtClean="0"/>
-              <a:t>5/14/2023</a:t>
+              <a:t>10-Jun-23</a:t>
             </a:fld>
             <a:endParaRPr lang="en-US"/>
           </a:p>
@@ -1967,7 +1967,7 @@
           <a:p>
             <a:fld id="{154673EC-443E-4E64-9ECA-ED48BC552C15}" type="datetimeFigureOut">
               <a:rPr lang="en-US" smtClean="0"/>
-              <a:t>5/14/2023</a:t>
+              <a:t>10-Jun-23</a:t>
             </a:fld>
             <a:endParaRPr lang="en-US"/>
           </a:p>
@@ -2080,7 +2080,7 @@
           <a:p>
             <a:fld id="{154673EC-443E-4E64-9ECA-ED48BC552C15}" type="datetimeFigureOut">
               <a:rPr lang="en-US" smtClean="0"/>
-              <a:t>5/14/2023</a:t>
+              <a:t>10-Jun-23</a:t>
             </a:fld>
             <a:endParaRPr lang="en-US"/>
           </a:p>
@@ -2391,7 +2391,7 @@
           <a:p>
             <a:fld id="{154673EC-443E-4E64-9ECA-ED48BC552C15}" type="datetimeFigureOut">
               <a:rPr lang="en-US" smtClean="0"/>
-              <a:t>5/14/2023</a:t>
+              <a:t>10-Jun-23</a:t>
             </a:fld>
             <a:endParaRPr lang="en-US"/>
           </a:p>
@@ -2679,7 +2679,7 @@
           <a:p>
             <a:fld id="{154673EC-443E-4E64-9ECA-ED48BC552C15}" type="datetimeFigureOut">
               <a:rPr lang="en-US" smtClean="0"/>
-              <a:t>5/14/2023</a:t>
+              <a:t>10-Jun-23</a:t>
             </a:fld>
             <a:endParaRPr lang="en-US"/>
           </a:p>
@@ -2920,7 +2920,7 @@
           <a:p>
             <a:fld id="{154673EC-443E-4E64-9ECA-ED48BC552C15}" type="datetimeFigureOut">
               <a:rPr lang="en-US" smtClean="0"/>
-              <a:t>5/14/2023</a:t>
+              <a:t>10-Jun-23</a:t>
             </a:fld>
             <a:endParaRPr lang="en-US"/>
           </a:p>
@@ -3782,7 +3782,7 @@
           <a:p>
             <a:r>
               <a:rPr lang="en-US" dirty="0"/>
-              <a:t>Add Project Title</a:t>
+              <a:t>Pocket Lens</a:t>
             </a:r>
           </a:p>
         </p:txBody>
@@ -3804,7 +3804,7 @@
         <p:spPr>
           <a:xfrm>
             <a:off x="1699987" y="4793611"/>
-            <a:ext cx="3697289" cy="1671638"/>
+            <a:ext cx="5241587" cy="1671638"/>
           </a:xfrm>
           <a:prstGeom prst="rect">
             <a:avLst/>
@@ -3921,33 +3921,31 @@
             </a:lvl9pPr>
           </a:lstStyle>
           <a:p>
+            <a:pPr algn="l"/>
             <a:r>
               <a:rPr lang="nl-NL" dirty="0"/>
-              <a:t>Add student 1 name – code</a:t>
-            </a:r>
-          </a:p>
-          <a:p>
+              <a:t>Ahmed Mohamed Ismail Nabil – 1180501</a:t>
+            </a:r>
+          </a:p>
+          <a:p>
+            <a:pPr algn="l"/>
             <a:r>
               <a:rPr lang="nl-NL" dirty="0"/>
-              <a:t>Add student 2 name – code</a:t>
-            </a:r>
-          </a:p>
-          <a:p>
+              <a:t>Moaz Mohamed Elsherbini – 1180528</a:t>
+            </a:r>
+          </a:p>
+          <a:p>
+            <a:pPr algn="l"/>
             <a:r>
               <a:rPr lang="nl-NL" dirty="0"/>
-              <a:t>Add student 3 name – code</a:t>
-            </a:r>
-          </a:p>
-          <a:p>
+              <a:t>Mostafa Ashraf Ahmed Kamal – 1180406</a:t>
+            </a:r>
+          </a:p>
+          <a:p>
+            <a:pPr algn="l"/>
             <a:r>
               <a:rPr lang="nl-NL" dirty="0"/>
-              <a:t>Add student 4 name – code</a:t>
-            </a:r>
-          </a:p>
-          <a:p>
-            <a:r>
-              <a:rPr lang="nl-NL" dirty="0"/>
-              <a:t>Add student 5 name – code</a:t>
+              <a:t>Nader Youhanna Adib Khalil – 1180477</a:t>
             </a:r>
           </a:p>
         </p:txBody>
@@ -4076,9 +4074,10 @@
             </a:lvl9pPr>
           </a:lstStyle>
           <a:p>
+            <a:pPr algn="l"/>
             <a:r>
               <a:rPr lang="en-US" dirty="0"/>
-              <a:t>Add Supervisor title &amp; name</a:t>
+              <a:t>Assoc. Prof. Dr. Mona Farouk</a:t>
             </a:r>
           </a:p>
         </p:txBody>

</xml_diff>